<commit_message>
dodate reference i malo popravljen tekst
</commit_message>
<xml_diff>
--- a/poster Solun maj 2024/Solun poster 002.pptx
+++ b/poster Solun maj 2024/Solun poster 002.pptx
@@ -5358,7 +5358,7 @@
           <a:p>
             <a:fld id="{E9776662-CA49-4C96-9773-885CF69B3004}" type="datetimeFigureOut">
               <a:rPr lang="en-US" smtClean="0"/>
-              <a:t>4/13/2024</a:t>
+              <a:t>4/17/2024</a:t>
             </a:fld>
             <a:endParaRPr lang="en-US"/>
           </a:p>
@@ -5891,7 +5891,7 @@
             <a:fld id="{7A200072-612F-4A00-B036-4E419A70927F}" type="datetimeFigureOut">
               <a:rPr lang="sr-Latn-BA" smtClean="0"/>
               <a:pPr/>
-              <a:t>13.4.2024.</a:t>
+              <a:t>17.4.2024.</a:t>
             </a:fld>
             <a:endParaRPr lang="sr-Latn-BA"/>
           </a:p>
@@ -6058,7 +6058,7 @@
             <a:fld id="{7A200072-612F-4A00-B036-4E419A70927F}" type="datetimeFigureOut">
               <a:rPr lang="sr-Latn-BA" smtClean="0"/>
               <a:pPr/>
-              <a:t>13.4.2024.</a:t>
+              <a:t>17.4.2024.</a:t>
             </a:fld>
             <a:endParaRPr lang="sr-Latn-BA"/>
           </a:p>
@@ -6235,7 +6235,7 @@
             <a:fld id="{7A200072-612F-4A00-B036-4E419A70927F}" type="datetimeFigureOut">
               <a:rPr lang="sr-Latn-BA" smtClean="0"/>
               <a:pPr/>
-              <a:t>13.4.2024.</a:t>
+              <a:t>17.4.2024.</a:t>
             </a:fld>
             <a:endParaRPr lang="sr-Latn-BA"/>
           </a:p>
@@ -6402,7 +6402,7 @@
             <a:fld id="{7A200072-612F-4A00-B036-4E419A70927F}" type="datetimeFigureOut">
               <a:rPr lang="sr-Latn-BA" smtClean="0"/>
               <a:pPr/>
-              <a:t>13.4.2024.</a:t>
+              <a:t>17.4.2024.</a:t>
             </a:fld>
             <a:endParaRPr lang="sr-Latn-BA"/>
           </a:p>
@@ -6645,7 +6645,7 @@
             <a:fld id="{7A200072-612F-4A00-B036-4E419A70927F}" type="datetimeFigureOut">
               <a:rPr lang="sr-Latn-BA" smtClean="0"/>
               <a:pPr/>
-              <a:t>13.4.2024.</a:t>
+              <a:t>17.4.2024.</a:t>
             </a:fld>
             <a:endParaRPr lang="sr-Latn-BA"/>
           </a:p>
@@ -6930,7 +6930,7 @@
             <a:fld id="{7A200072-612F-4A00-B036-4E419A70927F}" type="datetimeFigureOut">
               <a:rPr lang="sr-Latn-BA" smtClean="0"/>
               <a:pPr/>
-              <a:t>13.4.2024.</a:t>
+              <a:t>17.4.2024.</a:t>
             </a:fld>
             <a:endParaRPr lang="sr-Latn-BA"/>
           </a:p>
@@ -7354,7 +7354,7 @@
             <a:fld id="{7A200072-612F-4A00-B036-4E419A70927F}" type="datetimeFigureOut">
               <a:rPr lang="sr-Latn-BA" smtClean="0"/>
               <a:pPr/>
-              <a:t>13.4.2024.</a:t>
+              <a:t>17.4.2024.</a:t>
             </a:fld>
             <a:endParaRPr lang="sr-Latn-BA"/>
           </a:p>
@@ -7469,7 +7469,7 @@
             <a:fld id="{7A200072-612F-4A00-B036-4E419A70927F}" type="datetimeFigureOut">
               <a:rPr lang="sr-Latn-BA" smtClean="0"/>
               <a:pPr/>
-              <a:t>13.4.2024.</a:t>
+              <a:t>17.4.2024.</a:t>
             </a:fld>
             <a:endParaRPr lang="sr-Latn-BA"/>
           </a:p>
@@ -7561,7 +7561,7 @@
             <a:fld id="{7A200072-612F-4A00-B036-4E419A70927F}" type="datetimeFigureOut">
               <a:rPr lang="sr-Latn-BA" smtClean="0"/>
               <a:pPr/>
-              <a:t>13.4.2024.</a:t>
+              <a:t>17.4.2024.</a:t>
             </a:fld>
             <a:endParaRPr lang="sr-Latn-BA"/>
           </a:p>
@@ -7835,7 +7835,7 @@
             <a:fld id="{7A200072-612F-4A00-B036-4E419A70927F}" type="datetimeFigureOut">
               <a:rPr lang="sr-Latn-BA" smtClean="0"/>
               <a:pPr/>
-              <a:t>13.4.2024.</a:t>
+              <a:t>17.4.2024.</a:t>
             </a:fld>
             <a:endParaRPr lang="sr-Latn-BA"/>
           </a:p>
@@ -8085,7 +8085,7 @@
             <a:fld id="{7A200072-612F-4A00-B036-4E419A70927F}" type="datetimeFigureOut">
               <a:rPr lang="sr-Latn-BA" smtClean="0"/>
               <a:pPr/>
-              <a:t>13.4.2024.</a:t>
+              <a:t>17.4.2024.</a:t>
             </a:fld>
             <a:endParaRPr lang="sr-Latn-BA"/>
           </a:p>
@@ -8305,7 +8305,7 @@
             <a:fld id="{7A200072-612F-4A00-B036-4E419A70927F}" type="datetimeFigureOut">
               <a:rPr lang="sr-Latn-BA" smtClean="0"/>
               <a:pPr/>
-              <a:t>13.4.2024.</a:t>
+              <a:t>17.4.2024.</a:t>
             </a:fld>
             <a:endParaRPr lang="sr-Latn-BA"/>
           </a:p>
@@ -8681,7 +8681,7 @@
           <p:cNvPr id="28" name="Rounded Rectangle 3">
             <a:extLst>
               <a:ext uri="{FF2B5EF4-FFF2-40B4-BE49-F238E27FC236}">
-                <a16:creationId xmlns:a16="http://schemas.microsoft.com/office/drawing/2014/main" xmlns="" id="{E42E21C6-7A64-4E84-A503-EF9679DF851D}"/>
+                <a16:creationId xmlns="" xmlns:a16="http://schemas.microsoft.com/office/drawing/2014/main" id="{E42E21C6-7A64-4E84-A503-EF9679DF851D}"/>
               </a:ext>
             </a:extLst>
           </p:cNvPr>
@@ -8754,7 +8754,7 @@
           <p:cNvPr id="27" name="Rounded Rectangle 3">
             <a:extLst>
               <a:ext uri="{FF2B5EF4-FFF2-40B4-BE49-F238E27FC236}">
-                <a16:creationId xmlns:a16="http://schemas.microsoft.com/office/drawing/2014/main" xmlns="" id="{1C16C5A3-8C37-4B07-AA5E-BABF5084826F}"/>
+                <a16:creationId xmlns="" xmlns:a16="http://schemas.microsoft.com/office/drawing/2014/main" id="{1C16C5A3-8C37-4B07-AA5E-BABF5084826F}"/>
               </a:ext>
             </a:extLst>
           </p:cNvPr>
@@ -9422,15 +9422,7 @@
                   <a:srgbClr val="000000"/>
                 </a:solidFill>
               </a:rPr>
-              <a:t>[2] </a:t>
-            </a:r>
-            <a:r>
-              <a:rPr lang="en-US" sz="2200" dirty="0">
-                <a:solidFill>
-                  <a:srgbClr val="000000"/>
-                </a:solidFill>
-              </a:rPr>
-              <a:t>T. </a:t>
+              <a:t>[2] T. </a:t>
             </a:r>
             <a:r>
               <a:rPr lang="en-US" sz="2200" dirty="0" err="1">
@@ -9517,15 +9509,7 @@
                   <a:srgbClr val="000000"/>
                 </a:solidFill>
               </a:rPr>
-              <a:t>3</a:t>
-            </a:r>
-            <a:r>
-              <a:rPr lang="en-US" sz="2200" dirty="0">
-                <a:solidFill>
-                  <a:srgbClr val="000000"/>
-                </a:solidFill>
-              </a:rPr>
-              <a:t>] F. </a:t>
+              <a:t>3] F. </a:t>
             </a:r>
             <a:r>
               <a:rPr lang="en-US" sz="2200" dirty="0" err="1">
@@ -9666,7 +9650,39 @@
                   <a:srgbClr val="000000"/>
                 </a:solidFill>
               </a:rPr>
-              <a:t>[6] </a:t>
+              <a:t>[6] M.A</a:t>
+            </a:r>
+            <a:r>
+              <a:rPr lang="en-US" sz="2200" dirty="0" smtClean="0">
+                <a:solidFill>
+                  <a:srgbClr val="000000"/>
+                </a:solidFill>
+              </a:rPr>
+              <a:t>.</a:t>
+            </a:r>
+            <a:r>
+              <a:rPr lang="sr-Latn-BA" sz="2200" dirty="0" smtClean="0">
+                <a:solidFill>
+                  <a:srgbClr val="000000"/>
+                </a:solidFill>
+              </a:rPr>
+              <a:t> </a:t>
+            </a:r>
+            <a:r>
+              <a:rPr lang="en-US" sz="2200" dirty="0" err="1" smtClean="0">
+                <a:solidFill>
+                  <a:srgbClr val="000000"/>
+                </a:solidFill>
+              </a:rPr>
+              <a:t>Hibbs</a:t>
+            </a:r>
+            <a:r>
+              <a:rPr lang="en-US" sz="2200" dirty="0" smtClean="0">
+                <a:solidFill>
+                  <a:srgbClr val="000000"/>
+                </a:solidFill>
+              </a:rPr>
+              <a:t>, </a:t>
             </a:r>
             <a:r>
               <a:rPr lang="en-US" sz="2200" dirty="0">
@@ -9674,7 +9690,7 @@
                   <a:srgbClr val="000000"/>
                 </a:solidFill>
               </a:rPr>
-              <a:t>M.A</a:t>
+              <a:t>et </a:t>
             </a:r>
             <a:r>
               <a:rPr lang="en-US" sz="2200" dirty="0" smtClean="0">
@@ -9682,7 +9698,7 @@
                   <a:srgbClr val="000000"/>
                 </a:solidFill>
               </a:rPr>
-              <a:t>.</a:t>
+              <a:t>al.</a:t>
             </a:r>
             <a:r>
               <a:rPr lang="sr-Latn-BA" sz="2200" dirty="0" smtClean="0">
@@ -9693,60 +9709,12 @@
               <a:t> </a:t>
             </a:r>
             <a:r>
-              <a:rPr lang="en-US" sz="2200" dirty="0" err="1" smtClean="0">
-                <a:solidFill>
-                  <a:srgbClr val="000000"/>
-                </a:solidFill>
-              </a:rPr>
-              <a:t>Hibbs</a:t>
-            </a:r>
-            <a:r>
               <a:rPr lang="en-US" sz="2200" dirty="0" smtClean="0">
                 <a:solidFill>
                   <a:srgbClr val="000000"/>
                 </a:solidFill>
               </a:rPr>
-              <a:t>, </a:t>
-            </a:r>
-            <a:r>
-              <a:rPr lang="en-US" sz="2200" dirty="0">
-                <a:solidFill>
-                  <a:srgbClr val="000000"/>
-                </a:solidFill>
-              </a:rPr>
-              <a:t>et </a:t>
-            </a:r>
-            <a:r>
-              <a:rPr lang="en-US" sz="2200" dirty="0" smtClean="0">
-                <a:solidFill>
-                  <a:srgbClr val="000000"/>
-                </a:solidFill>
-              </a:rPr>
-              <a:t>al.</a:t>
-            </a:r>
-            <a:r>
-              <a:rPr lang="sr-Latn-BA" sz="2200" dirty="0" smtClean="0">
-                <a:solidFill>
-                  <a:srgbClr val="000000"/>
-                </a:solidFill>
-              </a:rPr>
-              <a:t> </a:t>
-            </a:r>
-            <a:r>
-              <a:rPr lang="en-US" sz="2200" dirty="0" smtClean="0">
-                <a:solidFill>
-                  <a:srgbClr val="000000"/>
-                </a:solidFill>
-              </a:rPr>
-              <a:t>“</a:t>
-            </a:r>
-            <a:r>
-              <a:rPr lang="en-US" sz="2200" dirty="0" smtClean="0">
-                <a:solidFill>
-                  <a:srgbClr val="000000"/>
-                </a:solidFill>
-              </a:rPr>
-              <a:t>Exploring </a:t>
+              <a:t>“Exploring </a:t>
             </a:r>
             <a:r>
               <a:rPr lang="en-US" sz="2200" dirty="0">
@@ -9983,21 +9951,210 @@
               <a:t> </a:t>
             </a:r>
             <a:r>
+              <a:rPr lang="en-US" sz="2200" dirty="0">
+                <a:solidFill>
+                  <a:srgbClr val="000000"/>
+                </a:solidFill>
+              </a:rPr>
+              <a:t>G. </a:t>
+            </a:r>
+            <a:r>
               <a:rPr lang="en-US" sz="2200" dirty="0" smtClean="0">
                 <a:solidFill>
                   <a:srgbClr val="000000"/>
                 </a:solidFill>
               </a:rPr>
+              <a:t>E.</a:t>
+            </a:r>
+            <a:r>
+              <a:rPr lang="sr-Latn-BA" sz="2200" dirty="0" smtClean="0">
+                <a:solidFill>
+                  <a:srgbClr val="000000"/>
+                </a:solidFill>
+              </a:rPr>
               <a:t> </a:t>
             </a:r>
             <a:r>
               <a:rPr lang="en-US" sz="2200" dirty="0" smtClean="0">
                 <a:solidFill>
-                  <a:srgbClr val="FF0000"/>
-                </a:solidFill>
-              </a:rPr>
-              <a:t>NENAD???</a:t>
-            </a:r>
+                  <a:srgbClr val="000000"/>
+                </a:solidFill>
+              </a:rPr>
+              <a:t>Batista,</a:t>
+            </a:r>
+            <a:r>
+              <a:rPr lang="sr-Latn-BA" sz="2200" dirty="0" smtClean="0">
+                <a:solidFill>
+                  <a:srgbClr val="000000"/>
+                </a:solidFill>
+              </a:rPr>
+              <a:t> </a:t>
+            </a:r>
+            <a:r>
+              <a:rPr lang="en-US" sz="2200" dirty="0">
+                <a:solidFill>
+                  <a:srgbClr val="000000"/>
+                </a:solidFill>
+              </a:rPr>
+              <a:t>R. </a:t>
+            </a:r>
+            <a:r>
+              <a:rPr lang="en-US" sz="2200" dirty="0" smtClean="0">
+                <a:solidFill>
+                  <a:srgbClr val="000000"/>
+                </a:solidFill>
+              </a:rPr>
+              <a:t>C</a:t>
+            </a:r>
+            <a:r>
+              <a:rPr lang="sr-Latn-BA" sz="2200" dirty="0" smtClean="0">
+                <a:solidFill>
+                  <a:srgbClr val="000000"/>
+                </a:solidFill>
+              </a:rPr>
+              <a:t>.</a:t>
+            </a:r>
+            <a:r>
+              <a:rPr lang="en-US" sz="2200" dirty="0" smtClean="0">
+                <a:solidFill>
+                  <a:srgbClr val="000000"/>
+                </a:solidFill>
+              </a:rPr>
+              <a:t> </a:t>
+            </a:r>
+            <a:r>
+              <a:rPr lang="en-US" sz="2200" dirty="0" err="1" smtClean="0">
+                <a:solidFill>
+                  <a:srgbClr val="000000"/>
+                </a:solidFill>
+              </a:rPr>
+              <a:t>Prati</a:t>
+            </a:r>
+            <a:r>
+              <a:rPr lang="en-US" sz="2200" dirty="0" smtClean="0">
+                <a:solidFill>
+                  <a:srgbClr val="000000"/>
+                </a:solidFill>
+              </a:rPr>
+              <a:t>, </a:t>
+            </a:r>
+            <a:r>
+              <a:rPr lang="sr-Latn-BA" sz="2200" dirty="0" smtClean="0">
+                <a:solidFill>
+                  <a:srgbClr val="000000"/>
+                </a:solidFill>
+              </a:rPr>
+              <a:t>and </a:t>
+            </a:r>
+            <a:r>
+              <a:rPr lang="en-US" sz="2200" dirty="0" smtClean="0">
+                <a:solidFill>
+                  <a:srgbClr val="000000"/>
+                </a:solidFill>
+              </a:rPr>
+              <a:t>M</a:t>
+            </a:r>
+            <a:r>
+              <a:rPr lang="en-US" sz="2200" dirty="0">
+                <a:solidFill>
+                  <a:srgbClr val="000000"/>
+                </a:solidFill>
+              </a:rPr>
+              <a:t>. C. </a:t>
+            </a:r>
+            <a:r>
+              <a:rPr lang="en-US" sz="2200" dirty="0" err="1" smtClean="0">
+                <a:solidFill>
+                  <a:srgbClr val="000000"/>
+                </a:solidFill>
+              </a:rPr>
+              <a:t>Monard</a:t>
+            </a:r>
+            <a:r>
+              <a:rPr lang="sr-Latn-BA" sz="2200" dirty="0">
+                <a:solidFill>
+                  <a:srgbClr val="000000"/>
+                </a:solidFill>
+              </a:rPr>
+              <a:t> </a:t>
+            </a:r>
+            <a:r>
+              <a:rPr lang="sr-Latn-BA" sz="2200" dirty="0" smtClean="0">
+                <a:solidFill>
+                  <a:srgbClr val="000000"/>
+                </a:solidFill>
+              </a:rPr>
+              <a:t> </a:t>
+            </a:r>
+            <a:r>
+              <a:rPr lang="en-US" sz="2200" dirty="0" smtClean="0">
+                <a:solidFill>
+                  <a:srgbClr val="000000"/>
+                </a:solidFill>
+              </a:rPr>
+              <a:t>“A </a:t>
+            </a:r>
+            <a:r>
+              <a:rPr lang="en-US" sz="2200" dirty="0">
+                <a:solidFill>
+                  <a:srgbClr val="000000"/>
+                </a:solidFill>
+              </a:rPr>
+              <a:t>study of the behavior of several methods for balancing machine learning training </a:t>
+            </a:r>
+            <a:r>
+              <a:rPr lang="en-US" sz="2200" dirty="0" smtClean="0">
+                <a:solidFill>
+                  <a:srgbClr val="000000"/>
+                </a:solidFill>
+              </a:rPr>
+              <a:t>data”. </a:t>
+            </a:r>
+            <a:r>
+              <a:rPr lang="en-US" sz="2200" dirty="0">
+                <a:solidFill>
+                  <a:srgbClr val="000000"/>
+                </a:solidFill>
+              </a:rPr>
+              <a:t>ACM SIGKDD explorations newsletter</a:t>
+            </a:r>
+            <a:r>
+              <a:rPr lang="en-US" sz="2200" dirty="0" smtClean="0">
+                <a:solidFill>
+                  <a:srgbClr val="000000"/>
+                </a:solidFill>
+              </a:rPr>
+              <a:t>, 2004</a:t>
+            </a:r>
+            <a:r>
+              <a:rPr lang="en-US" sz="2200" dirty="0">
+                <a:solidFill>
+                  <a:srgbClr val="000000"/>
+                </a:solidFill>
+              </a:rPr>
+              <a:t>,</a:t>
+            </a:r>
+            <a:r>
+              <a:rPr lang="en-US" sz="2200" dirty="0" smtClean="0">
+                <a:solidFill>
+                  <a:srgbClr val="000000"/>
+                </a:solidFill>
+              </a:rPr>
+              <a:t> </a:t>
+            </a:r>
+            <a:r>
+              <a:rPr lang="en-US" sz="2200" dirty="0">
+                <a:solidFill>
+                  <a:srgbClr val="000000"/>
+                </a:solidFill>
+              </a:rPr>
+              <a:t>6(1), 20-29.</a:t>
+            </a:r>
+            <a:endParaRPr lang="sr-Latn-BA" sz="2200" dirty="0" smtClean="0">
+              <a:solidFill>
+                <a:srgbClr val="000000"/>
+              </a:solidFill>
+            </a:endParaRPr>
           </a:p>
           <a:p>
             <a:pPr algn="just">
@@ -10101,11 +10258,6 @@
               </a:rPr>
               <a:t>.</a:t>
             </a:r>
-            <a:endParaRPr lang="en-US" sz="2200" dirty="0">
-              <a:solidFill>
-                <a:srgbClr val="000000"/>
-              </a:solidFill>
-            </a:endParaRPr>
           </a:p>
           <a:p>
             <a:pPr algn="just">
@@ -10114,20 +10266,12 @@
               </a:lnSpc>
             </a:pPr>
             <a:r>
-              <a:rPr lang="en-US" sz="2200" smtClean="0">
-                <a:solidFill>
-                  <a:srgbClr val="000000"/>
-                </a:solidFill>
-              </a:rPr>
-              <a:t>[11] </a:t>
-            </a:r>
-            <a:r>
               <a:rPr lang="en-US" sz="2200" dirty="0" smtClean="0">
                 <a:solidFill>
                   <a:srgbClr val="000000"/>
                 </a:solidFill>
               </a:rPr>
-              <a:t>D. </a:t>
+              <a:t>[11] D. </a:t>
             </a:r>
             <a:r>
               <a:rPr lang="en-US" sz="2200" dirty="0" err="1" smtClean="0">
@@ -10491,7 +10635,7 @@
         </p:nvSpPr>
         <p:spPr>
           <a:xfrm>
-            <a:off x="4067077" y="5866409"/>
+            <a:off x="4067077" y="5578377"/>
             <a:ext cx="7344816" cy="1224136"/>
           </a:xfrm>
           <a:prstGeom prst="roundRect">
@@ -10812,8 +10956,8 @@
         </p:nvSpPr>
         <p:spPr>
           <a:xfrm>
-            <a:off x="1906837" y="7378577"/>
-            <a:ext cx="11665296" cy="6001643"/>
+            <a:off x="1906837" y="6802513"/>
+            <a:ext cx="11665296" cy="6494085"/>
           </a:xfrm>
           <a:prstGeom prst="rect">
             <a:avLst/>
@@ -10829,39 +10973,125 @@
             <a:pPr algn="just"/>
             <a:r>
               <a:rPr lang="en-US" sz="3200" dirty="0"/>
-              <a:t>Intrinsically Disordered Proteins (IDPs) are vital for cellular functions like transcriptional regulation, translation transcriptional regulation, translation, and cell cycle control [1]. Unlike regular proteins, IDPs lack stable structures, allowing them to act as central hubs in protein-protein interaction (PPI) networks, crucial for signaling pathways. Traditional classification methods, based on secondary structures or amino acid sequences, </a:t>
-            </a:r>
-            <a:r>
-              <a:rPr lang="en-US" sz="3200" dirty="0">
-                <a:solidFill>
-                  <a:srgbClr val="FF0000"/>
-                </a:solidFill>
-              </a:rPr>
-              <a:t>aren't suitable for IDPs due to their instability.</a:t>
-            </a:r>
-          </a:p>
-          <a:p>
-            <a:pPr algn="just"/>
+              <a:t>Intrinsically Disordered Proteins (IDPs) are vital for cellular functions like transcriptional regulation, translation transcriptional regulation, translation, and cell cycle control [1]. Unlike regular proteins, IDPs lack stable structures, </a:t>
+            </a:r>
+            <a:r>
+              <a:rPr lang="en-US" sz="3200" dirty="0"/>
+              <a:t>which allows them to act as central hubs in protein-protein interaction (PPI) networks, crucial for signaling </a:t>
+            </a:r>
+            <a:r>
+              <a:rPr lang="en-US" sz="3200" dirty="0" smtClean="0"/>
+              <a:t>pathways</a:t>
+            </a:r>
+            <a:r>
+              <a:rPr lang="en-US" sz="3200" dirty="0"/>
+              <a:t>. </a:t>
+            </a:r>
+            <a:r>
+              <a:rPr lang="en-US" sz="3200" dirty="0" smtClean="0"/>
+              <a:t>Traditional </a:t>
+            </a:r>
+            <a:r>
+              <a:rPr lang="en-US" sz="3200" dirty="0"/>
+              <a:t>methods used for IDP classification primarily rely on information obtained from secondary structures or amino acid </a:t>
+            </a:r>
+            <a:r>
+              <a:rPr lang="en-US" sz="3200" dirty="0" smtClean="0"/>
+              <a:t>sequences.</a:t>
+            </a:r>
+            <a:r>
+              <a:rPr lang="sr-Latn-BA" sz="3200" dirty="0" smtClean="0"/>
+              <a:t> </a:t>
+            </a:r>
+            <a:r>
+              <a:rPr lang="en-US" sz="3200" dirty="0" smtClean="0"/>
+              <a:t>Integrating data from PPI networks </a:t>
+            </a:r>
+            <a:r>
+              <a:rPr lang="en-US" sz="3200" dirty="0" smtClean="0"/>
+              <a:t>can </a:t>
+            </a:r>
+            <a:r>
+              <a:rPr lang="sr-Latn-BA" sz="3200" dirty="0" smtClean="0"/>
+              <a:t>improve</a:t>
+            </a:r>
+            <a:r>
+              <a:rPr lang="en-US" sz="3200" dirty="0" smtClean="0"/>
+              <a:t> </a:t>
+            </a:r>
+            <a:r>
+              <a:rPr lang="en-US" sz="3200" dirty="0" smtClean="0"/>
+              <a:t>IDP classification as PPI networks</a:t>
+            </a:r>
+            <a:r>
+              <a:rPr lang="sr-Latn-BA" sz="3200" dirty="0" smtClean="0"/>
+              <a:t> </a:t>
+            </a:r>
+            <a:r>
+              <a:rPr lang="en-US" sz="3200" dirty="0" smtClean="0"/>
+              <a:t>leverages </a:t>
+            </a:r>
+            <a:r>
+              <a:rPr lang="en-US" sz="3200" dirty="0"/>
+              <a:t>the rich information contained in protein interactions which can enhance </a:t>
+            </a:r>
+            <a:r>
+              <a:rPr lang="en-US" sz="3200" dirty="0" smtClean="0"/>
+              <a:t>biological relevance</a:t>
+            </a:r>
+            <a:r>
+              <a:rPr lang="sr-Latn-BA" sz="3200" dirty="0" smtClean="0"/>
+              <a:t> of classification results.</a:t>
+            </a:r>
+            <a:r>
+              <a:rPr lang="en-US" sz="3200" dirty="0" smtClean="0"/>
+              <a:t> </a:t>
+            </a:r>
+            <a:r>
+              <a:rPr lang="sr-Latn-BA" sz="3200" dirty="0" smtClean="0"/>
+              <a:t>In this research, we </a:t>
+            </a:r>
+            <a:r>
+              <a:rPr lang="en-US" sz="3200" dirty="0" err="1" smtClean="0"/>
+              <a:t>combi</a:t>
+            </a:r>
+            <a:r>
+              <a:rPr lang="sr-Latn-BA" sz="3200" dirty="0" smtClean="0"/>
+              <a:t>ne</a:t>
+            </a:r>
+            <a:r>
+              <a:rPr lang="en-US" sz="3200" dirty="0" smtClean="0"/>
+              <a:t> </a:t>
+            </a:r>
+            <a:r>
+              <a:rPr lang="sr-Latn-BA" sz="3200" dirty="0" smtClean="0"/>
+              <a:t>data from different sources, including </a:t>
+            </a:r>
+            <a:r>
+              <a:rPr lang="en-US" sz="3200" dirty="0" smtClean="0"/>
+              <a:t>PPI network</a:t>
+            </a:r>
+            <a:r>
+              <a:rPr lang="sr-Latn-BA" sz="3200" dirty="0" smtClean="0"/>
+              <a:t>s</a:t>
+            </a:r>
+            <a:r>
+              <a:rPr lang="en-US" sz="3200" dirty="0" smtClean="0"/>
+              <a:t> </a:t>
+            </a:r>
+            <a:r>
+              <a:rPr lang="sr-Latn-BA" sz="3200" dirty="0" smtClean="0"/>
+              <a:t>and </a:t>
+            </a:r>
+            <a:r>
+              <a:rPr lang="en-US" sz="3200" dirty="0" smtClean="0"/>
+              <a:t>protein sequences</a:t>
+            </a:r>
+            <a:r>
+              <a:rPr lang="sr-Latn-BA" sz="3200" dirty="0" smtClean="0"/>
+              <a:t>, and test accuray of classification models.</a:t>
+            </a:r>
             <a:endParaRPr lang="en-US" sz="3200" dirty="0"/>
-          </a:p>
-          <a:p>
-            <a:pPr algn="just"/>
-            <a:r>
-              <a:rPr lang="en-US" sz="3200" dirty="0"/>
-              <a:t>Integrating data from PPI networks </a:t>
-            </a:r>
-            <a:r>
-              <a:rPr lang="en-US" sz="3200" dirty="0">
-                <a:solidFill>
-                  <a:srgbClr val="FF0000"/>
-                </a:solidFill>
-              </a:rPr>
-              <a:t>complicates</a:t>
-            </a:r>
-            <a:r>
-              <a:rPr lang="en-US" sz="3200" dirty="0"/>
-              <a:t> IDP classification as their roles vary across biological contexts, and PPI data are often noisy and incomplete. To address this, researchers are developing new methods combining PPI network data with protein sequences.</a:t>
-            </a:r>
           </a:p>
         </p:txBody>
       </p:sp>
@@ -11193,11 +11423,7 @@
             </a:r>
             <a:r>
               <a:rPr lang="sr-Latn-BA" sz="3200" dirty="0" smtClean="0"/>
-              <a:t> </a:t>
-            </a:r>
-            <a:r>
-              <a:rPr lang="sr-Latn-BA" sz="3200" dirty="0" smtClean="0"/>
-              <a:t>– for extraction of features from weighted network, based on random walks.</a:t>
+              <a:t> – for extraction of features from weighted network, based on random walks.</a:t>
             </a:r>
             <a:endParaRPr lang="en-US" sz="3200" dirty="0"/>
           </a:p>
@@ -11208,19 +11434,11 @@
             </a:pPr>
             <a:r>
               <a:rPr lang="en-US" sz="3200" dirty="0" smtClean="0"/>
-              <a:t>SMOTEEN </a:t>
-            </a:r>
-            <a:r>
-              <a:rPr lang="en-US" sz="3200" dirty="0" smtClean="0"/>
-              <a:t>[9]</a:t>
+              <a:t>SMOTEEN [9]</a:t>
             </a:r>
             <a:r>
               <a:rPr lang="sr-Latn-BA" sz="3200" dirty="0" smtClean="0"/>
-              <a:t> </a:t>
-            </a:r>
-            <a:r>
-              <a:rPr lang="sr-Latn-BA" sz="3200" dirty="0" smtClean="0"/>
-              <a:t>– for sampling training set</a:t>
+              <a:t> – for sampling training set</a:t>
             </a:r>
             <a:r>
               <a:rPr lang="en-US" sz="3200" dirty="0" smtClean="0"/>
@@ -11247,11 +11465,7 @@
             </a:r>
             <a:r>
               <a:rPr lang="sr-Latn-BA" sz="3200" dirty="0" smtClean="0"/>
-              <a:t> </a:t>
-            </a:r>
-            <a:r>
-              <a:rPr lang="sr-Latn-BA" sz="3200" dirty="0" smtClean="0"/>
-              <a:t>– for normalization of dataset</a:t>
+              <a:t> – for normalization of dataset</a:t>
             </a:r>
             <a:r>
               <a:rPr lang="en-US" sz="3200" dirty="0" smtClean="0"/>
@@ -11278,11 +11492,7 @@
             </a:r>
             <a:r>
               <a:rPr lang="sr-Latn-BA" sz="3200" dirty="0" smtClean="0"/>
-              <a:t> </a:t>
-            </a:r>
-            <a:r>
-              <a:rPr lang="sr-Latn-BA" sz="3200" dirty="0" smtClean="0"/>
-              <a:t>– for tuning hyperparametar of </a:t>
+              <a:t> – for tuning hyperparametar of </a:t>
             </a:r>
             <a:r>
               <a:rPr lang="en-US" sz="3200" dirty="0" smtClean="0"/>
@@ -11354,7 +11564,7 @@
           <p:cNvPr id="30" name="Rounded Rectangle 47">
             <a:extLst>
               <a:ext uri="{FF2B5EF4-FFF2-40B4-BE49-F238E27FC236}">
-                <a16:creationId xmlns:a16="http://schemas.microsoft.com/office/drawing/2014/main" xmlns="" id="{33946411-5D0B-4586-92C0-9422A01632C7}"/>
+                <a16:creationId xmlns="" xmlns:a16="http://schemas.microsoft.com/office/drawing/2014/main" id="{33946411-5D0B-4586-92C0-9422A01632C7}"/>
               </a:ext>
             </a:extLst>
           </p:cNvPr>
@@ -11409,7 +11619,7 @@
           <p:cNvPr id="31" name="Rounded Rectangle 47">
             <a:extLst>
               <a:ext uri="{FF2B5EF4-FFF2-40B4-BE49-F238E27FC236}">
-                <a16:creationId xmlns:a16="http://schemas.microsoft.com/office/drawing/2014/main" xmlns="" id="{5FB06176-787A-4601-99AD-07335A70D009}"/>
+                <a16:creationId xmlns="" xmlns:a16="http://schemas.microsoft.com/office/drawing/2014/main" id="{5FB06176-787A-4601-99AD-07335A70D009}"/>
               </a:ext>
             </a:extLst>
           </p:cNvPr>
@@ -11464,7 +11674,7 @@
           <p:cNvPr id="14" name="Diagram 13">
             <a:extLst>
               <a:ext uri="{FF2B5EF4-FFF2-40B4-BE49-F238E27FC236}">
-                <a16:creationId xmlns:a16="http://schemas.microsoft.com/office/drawing/2014/main" xmlns="" id="{AA320E81-5855-4B1B-A249-74E4C7FE7477}"/>
+                <a16:creationId xmlns="" xmlns:a16="http://schemas.microsoft.com/office/drawing/2014/main" id="{AA320E81-5855-4B1B-A249-74E4C7FE7477}"/>
               </a:ext>
             </a:extLst>
           </p:cNvPr>
@@ -11492,7 +11702,7 @@
           <p:cNvPr id="1026" name="Picture 2" descr="https://assets-global.website-files.com/621e95f9ac30687a56e4297e/64a8d750505cf8e707066669_V2_1676215759712_7b2330a6-df89-49b4-be67-3b44bfb50040.png">
             <a:extLst>
               <a:ext uri="{FF2B5EF4-FFF2-40B4-BE49-F238E27FC236}">
-                <a16:creationId xmlns:a16="http://schemas.microsoft.com/office/drawing/2014/main" xmlns="" id="{EBEBC945-E341-4136-8DC8-448F42B87F70}"/>
+                <a16:creationId xmlns="" xmlns:a16="http://schemas.microsoft.com/office/drawing/2014/main" id="{EBEBC945-E341-4136-8DC8-448F42B87F70}"/>
               </a:ext>
             </a:extLst>
           </p:cNvPr>
@@ -11537,7 +11747,7 @@
           <p:cNvPr id="44" name="Picture 2" descr="https://assets-global.website-files.com/621e95f9ac30687a56e4297e/64a8d750505cf8e707066669_V2_1676215759712_7b2330a6-df89-49b4-be67-3b44bfb50040.png">
             <a:extLst>
               <a:ext uri="{FF2B5EF4-FFF2-40B4-BE49-F238E27FC236}">
-                <a16:creationId xmlns:a16="http://schemas.microsoft.com/office/drawing/2014/main" xmlns="" id="{34F3213A-A300-4253-B3DE-16FD671B4B9E}"/>
+                <a16:creationId xmlns="" xmlns:a16="http://schemas.microsoft.com/office/drawing/2014/main" id="{34F3213A-A300-4253-B3DE-16FD671B4B9E}"/>
               </a:ext>
             </a:extLst>
           </p:cNvPr>
@@ -11582,7 +11792,7 @@
           <p:cNvPr id="18" name="Rectangle 17">
             <a:extLst>
               <a:ext uri="{FF2B5EF4-FFF2-40B4-BE49-F238E27FC236}">
-                <a16:creationId xmlns:a16="http://schemas.microsoft.com/office/drawing/2014/main" xmlns="" id="{15C5418E-2EC7-4CDD-A50D-4A1976FD60F2}"/>
+                <a16:creationId xmlns="" xmlns:a16="http://schemas.microsoft.com/office/drawing/2014/main" id="{15C5418E-2EC7-4CDD-A50D-4A1976FD60F2}"/>
               </a:ext>
             </a:extLst>
           </p:cNvPr>
@@ -11740,7 +11950,7 @@
           <p:cNvPr id="49" name="Rectangle 48">
             <a:extLst>
               <a:ext uri="{FF2B5EF4-FFF2-40B4-BE49-F238E27FC236}">
-                <a16:creationId xmlns:a16="http://schemas.microsoft.com/office/drawing/2014/main" xmlns="" id="{7FA12D37-8BE6-48FA-A3E0-7F6D80828A2A}"/>
+                <a16:creationId xmlns="" xmlns:a16="http://schemas.microsoft.com/office/drawing/2014/main" id="{7FA12D37-8BE6-48FA-A3E0-7F6D80828A2A}"/>
               </a:ext>
             </a:extLst>
           </p:cNvPr>
@@ -12108,7 +12318,7 @@
           <p:cNvPr id="50" name="Rectangle 49">
             <a:extLst>
               <a:ext uri="{FF2B5EF4-FFF2-40B4-BE49-F238E27FC236}">
-                <a16:creationId xmlns:a16="http://schemas.microsoft.com/office/drawing/2014/main" xmlns="" id="{8E1A2B0C-839C-4318-ACA5-56B88B30D089}"/>
+                <a16:creationId xmlns="" xmlns:a16="http://schemas.microsoft.com/office/drawing/2014/main" id="{8E1A2B0C-839C-4318-ACA5-56B88B30D089}"/>
               </a:ext>
             </a:extLst>
           </p:cNvPr>
@@ -12283,7 +12493,7 @@
           <p:cNvPr id="52" name="Rounded Rectangle 47">
             <a:extLst>
               <a:ext uri="{FF2B5EF4-FFF2-40B4-BE49-F238E27FC236}">
-                <a16:creationId xmlns:a16="http://schemas.microsoft.com/office/drawing/2014/main" xmlns="" id="{82BE85DE-FD18-4E3E-BE20-52E122985005}"/>
+                <a16:creationId xmlns="" xmlns:a16="http://schemas.microsoft.com/office/drawing/2014/main" id="{82BE85DE-FD18-4E3E-BE20-52E122985005}"/>
               </a:ext>
             </a:extLst>
           </p:cNvPr>
@@ -12340,7 +12550,7 @@
           <p:cNvPr id="20" name="Arrow: Right 19">
             <a:extLst>
               <a:ext uri="{FF2B5EF4-FFF2-40B4-BE49-F238E27FC236}">
-                <a16:creationId xmlns:a16="http://schemas.microsoft.com/office/drawing/2014/main" xmlns="" id="{F75BF84B-2C0D-4C09-BA31-AFAAC77EAF11}"/>
+                <a16:creationId xmlns="" xmlns:a16="http://schemas.microsoft.com/office/drawing/2014/main" id="{F75BF84B-2C0D-4C09-BA31-AFAAC77EAF11}"/>
               </a:ext>
             </a:extLst>
           </p:cNvPr>
@@ -12386,7 +12596,7 @@
           <p:cNvPr id="55" name="Arrow: Right 54">
             <a:extLst>
               <a:ext uri="{FF2B5EF4-FFF2-40B4-BE49-F238E27FC236}">
-                <a16:creationId xmlns:a16="http://schemas.microsoft.com/office/drawing/2014/main" xmlns="" id="{9FFA1951-3CD1-43F1-812E-2361512B994A}"/>
+                <a16:creationId xmlns="" xmlns:a16="http://schemas.microsoft.com/office/drawing/2014/main" id="{9FFA1951-3CD1-43F1-812E-2361512B994A}"/>
               </a:ext>
             </a:extLst>
           </p:cNvPr>
@@ -12432,7 +12642,7 @@
           <p:cNvPr id="56" name="Rectangle 55">
             <a:extLst>
               <a:ext uri="{FF2B5EF4-FFF2-40B4-BE49-F238E27FC236}">
-                <a16:creationId xmlns:a16="http://schemas.microsoft.com/office/drawing/2014/main" xmlns="" id="{54B82BF6-7CC1-4CC0-A076-02DDFFB69BDA}"/>
+                <a16:creationId xmlns="" xmlns:a16="http://schemas.microsoft.com/office/drawing/2014/main" id="{54B82BF6-7CC1-4CC0-A076-02DDFFB69BDA}"/>
               </a:ext>
             </a:extLst>
           </p:cNvPr>
@@ -12793,7 +13003,7 @@
           <p:cNvPr id="57" name="Rounded Rectangle 47">
             <a:extLst>
               <a:ext uri="{FF2B5EF4-FFF2-40B4-BE49-F238E27FC236}">
-                <a16:creationId xmlns:a16="http://schemas.microsoft.com/office/drawing/2014/main" xmlns="" id="{094D318D-7740-40B1-8FDC-752A452D00FC}"/>
+                <a16:creationId xmlns="" xmlns:a16="http://schemas.microsoft.com/office/drawing/2014/main" id="{094D318D-7740-40B1-8FDC-752A452D00FC}"/>
               </a:ext>
             </a:extLst>
           </p:cNvPr>
@@ -12850,7 +13060,7 @@
           <p:cNvPr id="58" name="Rectangle 57">
             <a:extLst>
               <a:ext uri="{FF2B5EF4-FFF2-40B4-BE49-F238E27FC236}">
-                <a16:creationId xmlns:a16="http://schemas.microsoft.com/office/drawing/2014/main" xmlns="" id="{E5A2346C-B437-4A8F-8C2E-BBED9297E0C1}"/>
+                <a16:creationId xmlns="" xmlns:a16="http://schemas.microsoft.com/office/drawing/2014/main" id="{E5A2346C-B437-4A8F-8C2E-BBED9297E0C1}"/>
               </a:ext>
             </a:extLst>
           </p:cNvPr>
@@ -13850,7 +14060,7 @@
           <p:cNvPr id="21" name="Diagram 20">
             <a:extLst>
               <a:ext uri="{FF2B5EF4-FFF2-40B4-BE49-F238E27FC236}">
-                <a16:creationId xmlns:a16="http://schemas.microsoft.com/office/drawing/2014/main" xmlns="" id="{E3B1F8A6-065A-446D-865B-A7233CC9A7C0}"/>
+                <a16:creationId xmlns="" xmlns:a16="http://schemas.microsoft.com/office/drawing/2014/main" id="{E3B1F8A6-065A-446D-865B-A7233CC9A7C0}"/>
               </a:ext>
             </a:extLst>
           </p:cNvPr>
@@ -13878,7 +14088,7 @@
           <p:cNvPr id="59" name="Rectangle 58">
             <a:extLst>
               <a:ext uri="{FF2B5EF4-FFF2-40B4-BE49-F238E27FC236}">
-                <a16:creationId xmlns:a16="http://schemas.microsoft.com/office/drawing/2014/main" xmlns="" id="{632B674B-5C97-4C65-B93A-0721E9DC16EE}"/>
+                <a16:creationId xmlns="" xmlns:a16="http://schemas.microsoft.com/office/drawing/2014/main" id="{632B674B-5C97-4C65-B93A-0721E9DC16EE}"/>
               </a:ext>
             </a:extLst>
           </p:cNvPr>
@@ -13933,7 +14143,7 @@
           <p:cNvPr id="60" name="Rectangle 59">
             <a:extLst>
               <a:ext uri="{FF2B5EF4-FFF2-40B4-BE49-F238E27FC236}">
-                <a16:creationId xmlns:a16="http://schemas.microsoft.com/office/drawing/2014/main" xmlns="" id="{1447920C-522C-48BD-BD46-479D0D73E142}"/>
+                <a16:creationId xmlns="" xmlns:a16="http://schemas.microsoft.com/office/drawing/2014/main" id="{1447920C-522C-48BD-BD46-479D0D73E142}"/>
               </a:ext>
             </a:extLst>
           </p:cNvPr>
@@ -16034,7 +16244,26 @@
             </a:r>
             <a:r>
               <a:rPr lang="en-US" sz="3200" dirty="0"/>
-              <a:t>predict the most intrinsically disordered protein (IDP) effectively. </a:t>
+              <a:t>predict the most intrinsically disordered </a:t>
+            </a:r>
+            <a:r>
+              <a:rPr lang="en-US" sz="3200" dirty="0" smtClean="0"/>
+              <a:t>proteins </a:t>
+            </a:r>
+            <a:r>
+              <a:rPr lang="en-US" sz="3200" dirty="0"/>
+              <a:t>(</a:t>
+            </a:r>
+            <a:r>
+              <a:rPr lang="en-US" sz="3200" dirty="0" smtClean="0"/>
+              <a:t>IDPs).</a:t>
+            </a:r>
+          </a:p>
+          <a:p>
+            <a:pPr algn="just"/>
+            <a:r>
+              <a:rPr lang="en-US" sz="3200" dirty="0" smtClean="0"/>
+              <a:t> </a:t>
             </a:r>
             <a:endParaRPr lang="sr-Latn-BA" sz="3200" dirty="0" smtClean="0"/>
           </a:p>
@@ -16046,7 +16275,31 @@
             </a:r>
             <a:r>
               <a:rPr lang="en-US" sz="3200" dirty="0"/>
-              <a:t>findings suggest that integrating attributes from both network and sequence has potential, opening avenues for further methodological refinement. Moreover, the proposed approach should be applied to other networks of different organisms, including human networks. Additionally, combining existing attributes with those derived from other protein characteristics could be a promising direction for future research.</a:t>
+              <a:t>findings suggest that integrating attributes from both network and sequence has potential, opening avenues for further methodological refinement. </a:t>
+            </a:r>
+            <a:r>
+              <a:rPr lang="en-US" sz="3200" dirty="0" smtClean="0"/>
+              <a:t>In order to further investigate the capability of this approach, it </a:t>
+            </a:r>
+            <a:r>
+              <a:rPr lang="en-US" sz="3200" dirty="0"/>
+              <a:t>should be applied </a:t>
+            </a:r>
+            <a:r>
+              <a:rPr lang="en-US" sz="3200" dirty="0" smtClean="0"/>
+              <a:t>on </a:t>
+            </a:r>
+            <a:r>
+              <a:rPr lang="en-US" sz="3200" dirty="0"/>
+              <a:t>other networks </a:t>
+            </a:r>
+            <a:r>
+              <a:rPr lang="en-US" sz="3200" dirty="0" smtClean="0"/>
+              <a:t>of </a:t>
+            </a:r>
+            <a:r>
+              <a:rPr lang="en-US" sz="3200" dirty="0"/>
+              <a:t>different organisms, including human networks. Additionally, combining existing attributes with those derived from other protein characteristics could be a promising direction for future research.</a:t>
             </a:r>
             <a:r>
               <a:rPr lang="sr-Latn-BA" sz="3200" dirty="0" smtClean="0"/>
@@ -16061,7 +16314,7 @@
           <p:cNvPr id="46" name="Arrow: Right 19">
             <a:extLst>
               <a:ext uri="{FF2B5EF4-FFF2-40B4-BE49-F238E27FC236}">
-                <a16:creationId xmlns:a16="http://schemas.microsoft.com/office/drawing/2014/main" xmlns="" id="{F75BF84B-2C0D-4C09-BA31-AFAAC77EAF11}"/>
+                <a16:creationId xmlns="" xmlns:a16="http://schemas.microsoft.com/office/drawing/2014/main" id="{F75BF84B-2C0D-4C09-BA31-AFAAC77EAF11}"/>
               </a:ext>
             </a:extLst>
           </p:cNvPr>

</xml_diff>